<commit_message>
S04P31A201-39 docs edit : youngrok introduce
edit youngrok introduce
</commit_message>
<xml_diff>
--- a/docs/Introduce/SDS_자기소개_김영록.pptx
+++ b/docs/Introduce/SDS_자기소개_김영록.pptx
@@ -5474,13 +5474,108 @@
       </p:sp>
       <p:sp>
         <p:nvSpPr>
-          <p:cNvPr id="40" name="모서리가 둥근 직사각형 39"/>
+          <p:cNvPr id="6" name="TextBox 5">
+            <a:extLst>
+              <a:ext uri="{FF2B5EF4-FFF2-40B4-BE49-F238E27FC236}">
+                <a16:creationId xmlns:a16="http://schemas.microsoft.com/office/drawing/2014/main" id="{1661D274-E386-4500-90D9-6F3325482F70}"/>
+              </a:ext>
+            </a:extLst>
+          </p:cNvPr>
+          <p:cNvSpPr txBox="1"/>
+          <p:nvPr/>
+        </p:nvSpPr>
+        <p:spPr>
+          <a:xfrm>
+            <a:off x="3265714" y="2071254"/>
+            <a:ext cx="976549" cy="369332"/>
+          </a:xfrm>
+          <a:prstGeom prst="rect">
+            <a:avLst/>
+          </a:prstGeom>
+          <a:noFill/>
+        </p:spPr>
+        <p:txBody>
+          <a:bodyPr wrap="none" rtlCol="0">
+            <a:spAutoFit/>
+          </a:bodyPr>
+          <a:lstStyle/>
+          <a:p>
+            <a:r>
+              <a:rPr lang="en-US" altLang="ko-KR" dirty="0"/>
+              <a:t>Pick Pic</a:t>
+            </a:r>
+            <a:endParaRPr lang="ko-KR" altLang="en-US" dirty="0"/>
+          </a:p>
+        </p:txBody>
+      </p:sp>
+      <p:sp>
+        <p:nvSpPr>
+          <p:cNvPr id="9" name="TextBox 8">
+            <a:extLst>
+              <a:ext uri="{FF2B5EF4-FFF2-40B4-BE49-F238E27FC236}">
+                <a16:creationId xmlns:a16="http://schemas.microsoft.com/office/drawing/2014/main" id="{E62D7B3B-5A40-48E3-AE0D-B32C36759DA1}"/>
+              </a:ext>
+            </a:extLst>
+          </p:cNvPr>
+          <p:cNvSpPr txBox="1"/>
+          <p:nvPr/>
+        </p:nvSpPr>
+        <p:spPr>
+          <a:xfrm>
+            <a:off x="3265715" y="2849217"/>
+            <a:ext cx="8764920" cy="923330"/>
+          </a:xfrm>
+          <a:prstGeom prst="rect">
+            <a:avLst/>
+          </a:prstGeom>
+          <a:noFill/>
+        </p:spPr>
+        <p:txBody>
+          <a:bodyPr wrap="square" rtlCol="0">
+            <a:spAutoFit/>
+          </a:bodyPr>
+          <a:lstStyle/>
+          <a:p>
+            <a:r>
+              <a:rPr lang="ko-KR" altLang="en-US" dirty="0"/>
+              <a:t>사용자들이 편하게 사용할 수 있는 블로그를 제작하고</a:t>
+            </a:r>
+            <a:r>
+              <a:rPr lang="en-US" altLang="ko-KR" dirty="0"/>
+              <a:t>, </a:t>
+            </a:r>
+            <a:r>
+              <a:rPr lang="ko-KR" altLang="en-US" dirty="0"/>
+              <a:t>고민되는 사항에 대하여</a:t>
+            </a:r>
+            <a:endParaRPr lang="en-US" altLang="ko-KR" dirty="0"/>
+          </a:p>
+          <a:p>
+            <a:endParaRPr lang="en-US" altLang="ko-KR" dirty="0"/>
+          </a:p>
+          <a:p>
+            <a:r>
+              <a:rPr lang="ko-KR" altLang="en-US" dirty="0"/>
+              <a:t>사진을 통해 다른 사용자들이 투표를 통해 결정하는 것에 도움을 줄 수 있게 제작</a:t>
+            </a:r>
+          </a:p>
+        </p:txBody>
+      </p:sp>
+      <p:sp>
+        <p:nvSpPr>
+          <p:cNvPr id="10" name="모서리가 둥근 직사각형 39">
+            <a:extLst>
+              <a:ext uri="{FF2B5EF4-FFF2-40B4-BE49-F238E27FC236}">
+                <a16:creationId xmlns:a16="http://schemas.microsoft.com/office/drawing/2014/main" id="{FFAC6940-566B-4A51-A558-4D1EE9BA7D39}"/>
+              </a:ext>
+            </a:extLst>
+          </p:cNvPr>
           <p:cNvSpPr/>
           <p:nvPr/>
         </p:nvSpPr>
         <p:spPr>
           <a:xfrm>
-            <a:off x="1025233" y="4552607"/>
+            <a:off x="1025232" y="4556355"/>
             <a:ext cx="1884219" cy="429491"/>
           </a:xfrm>
           <a:prstGeom prst="roundRect">
@@ -5516,17 +5611,17 @@
             <a:pPr algn="ctr"/>
             <a:r>
               <a:rPr lang="ko-KR" altLang="en-US" sz="1600" b="1" dirty="0"/>
-              <a:t>기술 스택</a:t>
-            </a:r>
-          </a:p>
-        </p:txBody>
-      </p:sp>
-      <p:sp>
-        <p:nvSpPr>
-          <p:cNvPr id="6" name="TextBox 5">
+              <a:t>역할</a:t>
+            </a:r>
+          </a:p>
+        </p:txBody>
+      </p:sp>
+      <p:sp>
+        <p:nvSpPr>
+          <p:cNvPr id="4" name="TextBox 3">
             <a:extLst>
               <a:ext uri="{FF2B5EF4-FFF2-40B4-BE49-F238E27FC236}">
-                <a16:creationId xmlns:a16="http://schemas.microsoft.com/office/drawing/2014/main" id="{1661D274-E386-4500-90D9-6F3325482F70}"/>
+                <a16:creationId xmlns:a16="http://schemas.microsoft.com/office/drawing/2014/main" id="{EE1BAB93-4006-4706-904B-CF2037F5D2E6}"/>
               </a:ext>
             </a:extLst>
           </p:cNvPr>
@@ -5535,8 +5630,8 @@
         </p:nvSpPr>
         <p:spPr>
           <a:xfrm>
-            <a:off x="3265714" y="2071254"/>
-            <a:ext cx="976549" cy="369332"/>
+            <a:off x="3265714" y="4522968"/>
+            <a:ext cx="4883204" cy="1200329"/>
           </a:xfrm>
           <a:prstGeom prst="rect">
             <a:avLst/>
@@ -5544,50 +5639,18 @@
           <a:noFill/>
         </p:spPr>
         <p:txBody>
-          <a:bodyPr wrap="none" rtlCol="0">
-            <a:spAutoFit/>
-          </a:bodyPr>
-          <a:lstStyle/>
-          <a:p>
-            <a:r>
-              <a:rPr lang="en-US" altLang="ko-KR" dirty="0"/>
-              <a:t>Pick Pic</a:t>
-            </a:r>
-            <a:endParaRPr lang="ko-KR" altLang="en-US" dirty="0"/>
-          </a:p>
-        </p:txBody>
-      </p:sp>
-      <p:sp>
-        <p:nvSpPr>
-          <p:cNvPr id="9" name="TextBox 8">
-            <a:extLst>
-              <a:ext uri="{FF2B5EF4-FFF2-40B4-BE49-F238E27FC236}">
-                <a16:creationId xmlns:a16="http://schemas.microsoft.com/office/drawing/2014/main" id="{E62D7B3B-5A40-48E3-AE0D-B32C36759DA1}"/>
-              </a:ext>
-            </a:extLst>
-          </p:cNvPr>
-          <p:cNvSpPr txBox="1"/>
-          <p:nvPr/>
-        </p:nvSpPr>
-        <p:spPr>
-          <a:xfrm>
-            <a:off x="3265715" y="2849217"/>
-            <a:ext cx="4538256" cy="1200329"/>
-          </a:xfrm>
-          <a:prstGeom prst="rect">
-            <a:avLst/>
-          </a:prstGeom>
-          <a:noFill/>
-        </p:spPr>
-        <p:txBody>
           <a:bodyPr wrap="square" rtlCol="0">
             <a:spAutoFit/>
           </a:bodyPr>
           <a:lstStyle/>
           <a:p>
             <a:r>
+              <a:rPr lang="en-US" altLang="ko-KR" dirty="0"/>
+              <a:t>Frontend </a:t>
+            </a:r>
+            <a:r>
               <a:rPr lang="ko-KR" altLang="en-US" dirty="0"/>
-              <a:t>사용자들이 편하게 사용할 수 있는 블로그를 제작하고</a:t>
+              <a:t>담당</a:t>
             </a:r>
             <a:r>
               <a:rPr lang="en-US" altLang="ko-KR" dirty="0"/>
@@ -5595,63 +5658,165 @@
             </a:r>
             <a:r>
               <a:rPr lang="ko-KR" altLang="en-US" dirty="0"/>
-              <a:t>고민되는 사항에 대하여</a:t>
+              <a:t>팀장 역할 수행</a:t>
             </a:r>
             <a:endParaRPr lang="en-US" altLang="ko-KR" dirty="0"/>
           </a:p>
           <a:p>
             <a:r>
+              <a:rPr lang="en-US" altLang="ko-KR" dirty="0" err="1"/>
+              <a:t>Vue.js</a:t>
+            </a:r>
+            <a:r>
+              <a:rPr lang="en-US" altLang="ko-KR" dirty="0"/>
+              <a:t> </a:t>
+            </a:r>
+            <a:r>
               <a:rPr lang="ko-KR" altLang="en-US" dirty="0"/>
-              <a:t>사진을 통해 다른 사용자들이 투표를 통해 결정하는 것에 도움을 줄 수 있게 제작</a:t>
-            </a:r>
-          </a:p>
-        </p:txBody>
-      </p:sp>
-      <p:pic>
-        <p:nvPicPr>
-          <p:cNvPr id="12" name="그림 11">
-            <a:extLst>
-              <a:ext uri="{FF2B5EF4-FFF2-40B4-BE49-F238E27FC236}">
-                <a16:creationId xmlns:a16="http://schemas.microsoft.com/office/drawing/2014/main" id="{D1D3A833-5EC6-46EB-9548-89B15DA24BCD}"/>
-              </a:ext>
-            </a:extLst>
-          </p:cNvPr>
-          <p:cNvPicPr>
-            <a:picLocks noChangeAspect="1"/>
-          </p:cNvPicPr>
-          <p:nvPr/>
-        </p:nvPicPr>
-        <p:blipFill>
-          <a:blip r:embed="rId3"/>
-          <a:stretch>
-            <a:fillRect/>
-          </a:stretch>
-        </p:blipFill>
+              <a:t>및 </a:t>
+            </a:r>
+            <a:r>
+              <a:rPr lang="en-US" altLang="ko-KR" dirty="0" err="1"/>
+              <a:t>Vuetify</a:t>
+            </a:r>
+            <a:r>
+              <a:rPr lang="en-US" altLang="ko-KR" dirty="0"/>
+              <a:t>, </a:t>
+            </a:r>
+            <a:r>
+              <a:rPr lang="en-US" altLang="ko-KR" dirty="0" err="1"/>
+              <a:t>Vuex</a:t>
+            </a:r>
+            <a:r>
+              <a:rPr lang="en-US" altLang="ko-KR" dirty="0"/>
+              <a:t>, </a:t>
+            </a:r>
+            <a:r>
+              <a:rPr lang="en-US" altLang="ko-KR" dirty="0" err="1"/>
+              <a:t>Axios</a:t>
+            </a:r>
+            <a:r>
+              <a:rPr lang="ko-KR" altLang="en-US" dirty="0"/>
+              <a:t>를 사용하여</a:t>
+            </a:r>
+            <a:endParaRPr lang="en-US" altLang="ko-KR" dirty="0"/>
+          </a:p>
+          <a:p>
+            <a:r>
+              <a:rPr lang="ko-KR" altLang="en-US" dirty="0"/>
+              <a:t>게시글</a:t>
+            </a:r>
+            <a:r>
+              <a:rPr lang="en-US" altLang="ko-KR" dirty="0"/>
+              <a:t>, </a:t>
+            </a:r>
+            <a:r>
+              <a:rPr lang="ko-KR" altLang="en-US" dirty="0"/>
+              <a:t>게시글 상세보기</a:t>
+            </a:r>
+            <a:r>
+              <a:rPr lang="en-US" altLang="ko-KR" dirty="0"/>
+              <a:t>, </a:t>
+            </a:r>
+          </a:p>
+          <a:p>
+            <a:r>
+              <a:rPr lang="ko-KR" altLang="en-US" dirty="0"/>
+              <a:t>에디터 구현 및 </a:t>
+            </a:r>
+            <a:r>
+              <a:rPr lang="en-US" altLang="ko-KR" dirty="0" err="1"/>
+              <a:t>FrontEnd</a:t>
+            </a:r>
+            <a:r>
+              <a:rPr lang="en-US" altLang="ko-KR" dirty="0"/>
+              <a:t> </a:t>
+            </a:r>
+            <a:r>
+              <a:rPr lang="ko-KR" altLang="en-US" dirty="0"/>
+              <a:t>배포</a:t>
+            </a:r>
+          </a:p>
+        </p:txBody>
+      </p:sp>
+    </p:spTree>
+    <p:extLst>
+      <p:ext uri="{BB962C8B-B14F-4D97-AF65-F5344CB8AC3E}">
+        <p14:creationId xmlns:p14="http://schemas.microsoft.com/office/powerpoint/2010/main" val="1810173923"/>
+      </p:ext>
+    </p:extLst>
+  </p:cSld>
+  <p:clrMapOvr>
+    <a:masterClrMapping/>
+  </p:clrMapOvr>
+  <mc:AlternateContent xmlns:mc="http://schemas.openxmlformats.org/markup-compatibility/2006" xmlns:p14="http://schemas.microsoft.com/office/powerpoint/2010/main">
+    <mc:Choice Requires="p14">
+      <p:transition spd="med" p14:dur="700">
+        <p:fade/>
+      </p:transition>
+    </mc:Choice>
+    <mc:Fallback xmlns="">
+      <p:transition spd="med">
+        <p:fade/>
+      </p:transition>
+    </mc:Fallback>
+  </mc:AlternateContent>
+</p:sld>
+</file>
+
+<file path=ppt/slides/slide3.xml><?xml version="1.0" encoding="utf-8"?>
+<p:sld xmlns:a="http://schemas.openxmlformats.org/drawingml/2006/main" xmlns:r="http://schemas.openxmlformats.org/officeDocument/2006/relationships" xmlns:p="http://schemas.openxmlformats.org/presentationml/2006/main">
+  <p:cSld>
+    <p:spTree>
+      <p:nvGrpSpPr>
+        <p:cNvPr id="1" name=""/>
+        <p:cNvGrpSpPr/>
+        <p:nvPr/>
+      </p:nvGrpSpPr>
+      <p:grpSpPr>
+        <a:xfrm>
+          <a:off x="0" y="0"/>
+          <a:ext cx="0" cy="0"/>
+          <a:chOff x="0" y="0"/>
+          <a:chExt cx="0" cy="0"/>
+        </a:xfrm>
+      </p:grpSpPr>
+      <p:sp>
+        <p:nvSpPr>
+          <p:cNvPr id="3" name="제목 2"/>
+          <p:cNvSpPr>
+            <a:spLocks noGrp="1"/>
+          </p:cNvSpPr>
+          <p:nvPr>
+            <p:ph type="title"/>
+          </p:nvPr>
+        </p:nvSpPr>
         <p:spPr>
           <a:xfrm>
-            <a:off x="7803971" y="1622369"/>
-            <a:ext cx="3711440" cy="4850008"/>
+            <a:off x="1404589" y="782706"/>
+            <a:ext cx="7573156" cy="584735"/>
           </a:xfrm>
-          <a:prstGeom prst="rect">
-            <a:avLst/>
-          </a:prstGeom>
         </p:spPr>
-      </p:pic>
-      <p:sp>
-        <p:nvSpPr>
-          <p:cNvPr id="10" name="모서리가 둥근 직사각형 39">
-            <a:extLst>
-              <a:ext uri="{FF2B5EF4-FFF2-40B4-BE49-F238E27FC236}">
-                <a16:creationId xmlns:a16="http://schemas.microsoft.com/office/drawing/2014/main" id="{FFAC6940-566B-4A51-A558-4D1EE9BA7D39}"/>
-              </a:ext>
-            </a:extLst>
-          </p:cNvPr>
+        <p:txBody>
+          <a:bodyPr/>
+          <a:lstStyle/>
+          <a:p>
+            <a:r>
+              <a:rPr lang="ko-KR" altLang="en-US" dirty="0"/>
+              <a:t>특화 프로젝트 소개</a:t>
+            </a:r>
+          </a:p>
+        </p:txBody>
+      </p:sp>
+      <p:sp>
+        <p:nvSpPr>
+          <p:cNvPr id="2" name="모서리가 둥근 직사각형 1"/>
           <p:cNvSpPr/>
           <p:nvPr/>
         </p:nvSpPr>
         <p:spPr>
           <a:xfrm>
-            <a:off x="1025232" y="5685911"/>
+            <a:off x="1021358" y="2033244"/>
             <a:ext cx="1884219" cy="429491"/>
           </a:xfrm>
           <a:prstGeom prst="roundRect">
@@ -5687,27 +5852,21 @@
             <a:pPr algn="ctr"/>
             <a:r>
               <a:rPr lang="ko-KR" altLang="en-US" sz="1600" b="1" dirty="0"/>
-              <a:t>역할</a:t>
-            </a:r>
-          </a:p>
-        </p:txBody>
-      </p:sp>
-      <p:sp>
-        <p:nvSpPr>
-          <p:cNvPr id="4" name="TextBox 3">
-            <a:extLst>
-              <a:ext uri="{FF2B5EF4-FFF2-40B4-BE49-F238E27FC236}">
-                <a16:creationId xmlns:a16="http://schemas.microsoft.com/office/drawing/2014/main" id="{EE1BAB93-4006-4706-904B-CF2037F5D2E6}"/>
-              </a:ext>
-            </a:extLst>
-          </p:cNvPr>
+              <a:t>프로젝트 주제</a:t>
+            </a:r>
+          </a:p>
+        </p:txBody>
+      </p:sp>
+      <p:sp>
+        <p:nvSpPr>
+          <p:cNvPr id="4" name="TextBox 3"/>
           <p:cNvSpPr txBox="1"/>
           <p:nvPr/>
         </p:nvSpPr>
         <p:spPr>
           <a:xfrm>
-            <a:off x="3265714" y="5652524"/>
-            <a:ext cx="4975978" cy="646331"/>
+            <a:off x="3057041" y="2063323"/>
+            <a:ext cx="5997844" cy="369332"/>
           </a:xfrm>
           <a:prstGeom prst="rect">
             <a:avLst/>
@@ -5715,185 +5874,32 @@
           <a:noFill/>
         </p:spPr>
         <p:txBody>
-          <a:bodyPr wrap="none" rtlCol="0">
+          <a:bodyPr wrap="square" rtlCol="0">
             <a:spAutoFit/>
           </a:bodyPr>
           <a:lstStyle/>
           <a:p>
             <a:r>
+              <a:rPr lang="ko-KR" altLang="en-US" dirty="0"/>
+              <a:t>안전하게 만날 수 있는 약속 장소 추천 서비스</a:t>
+            </a:r>
+            <a:r>
               <a:rPr lang="en-US" altLang="ko-KR" dirty="0"/>
-              <a:t>Frontend -&gt; </a:t>
-            </a:r>
-            <a:r>
-              <a:rPr lang="ko-KR" altLang="en-US" dirty="0"/>
-              <a:t>게시판</a:t>
-            </a:r>
-            <a:r>
-              <a:rPr lang="en-US" altLang="ko-KR" dirty="0"/>
-              <a:t>, </a:t>
-            </a:r>
-            <a:r>
-              <a:rPr lang="ko-KR" altLang="en-US" dirty="0"/>
-              <a:t>관리자게시판</a:t>
-            </a:r>
-            <a:r>
-              <a:rPr lang="en-US" altLang="ko-KR" dirty="0"/>
-              <a:t>, </a:t>
-            </a:r>
-          </a:p>
-          <a:p>
-            <a:r>
-              <a:rPr lang="ko-KR" altLang="en-US" dirty="0"/>
-              <a:t>에디터 구현 및 팀장 역할 수행</a:t>
-            </a:r>
-            <a:r>
-              <a:rPr lang="en-US" altLang="ko-KR" dirty="0"/>
-              <a:t>, </a:t>
-            </a:r>
-            <a:r>
-              <a:rPr lang="en-US" altLang="ko-KR" dirty="0" err="1"/>
-              <a:t>FrontEnd</a:t>
-            </a:r>
-            <a:r>
-              <a:rPr lang="en-US" altLang="ko-KR" dirty="0"/>
-              <a:t> </a:t>
-            </a:r>
-            <a:r>
-              <a:rPr lang="ko-KR" altLang="en-US" dirty="0"/>
-              <a:t>배포</a:t>
-            </a:r>
-          </a:p>
-        </p:txBody>
-      </p:sp>
-      <p:grpSp>
-        <p:nvGrpSpPr>
-          <p:cNvPr id="13" name="그룹 12">
-            <a:extLst>
-              <a:ext uri="{FF2B5EF4-FFF2-40B4-BE49-F238E27FC236}">
-                <a16:creationId xmlns:a16="http://schemas.microsoft.com/office/drawing/2014/main" id="{65987893-EF8D-48C1-B22E-FE9B9E2851F4}"/>
-              </a:ext>
-            </a:extLst>
-          </p:cNvPr>
-          <p:cNvGrpSpPr/>
+              <a:t>(CO-MEET)</a:t>
+            </a:r>
+            <a:endParaRPr lang="ko-KR" altLang="en-US" dirty="0"/>
+          </a:p>
+        </p:txBody>
+      </p:sp>
+      <p:sp>
+        <p:nvSpPr>
+          <p:cNvPr id="11" name="모서리가 둥근 직사각형 10"/>
+          <p:cNvSpPr/>
           <p:nvPr/>
-        </p:nvGrpSpPr>
-        <p:grpSpPr>
-          <a:xfrm>
-            <a:off x="3218667" y="4059261"/>
-            <a:ext cx="3549686" cy="1472061"/>
-            <a:chOff x="7248085" y="3145056"/>
-            <a:chExt cx="8349399" cy="5547309"/>
-          </a:xfrm>
-        </p:grpSpPr>
-        <p:pic>
-          <p:nvPicPr>
-            <p:cNvPr id="14" name="Object 21">
-              <a:extLst>
-                <a:ext uri="{FF2B5EF4-FFF2-40B4-BE49-F238E27FC236}">
-                  <a16:creationId xmlns:a16="http://schemas.microsoft.com/office/drawing/2014/main" id="{D9C4EAD7-EFC6-4BC6-808F-A092AF4B1BC4}"/>
-                </a:ext>
-              </a:extLst>
-            </p:cNvPr>
-            <p:cNvPicPr>
-              <a:picLocks noChangeAspect="1"/>
-            </p:cNvPicPr>
-            <p:nvPr/>
-          </p:nvPicPr>
-          <p:blipFill>
-            <a:blip r:embed="rId4" cstate="print"/>
-            <a:stretch>
-              <a:fillRect/>
-            </a:stretch>
-          </p:blipFill>
-          <p:spPr>
-            <a:xfrm>
-              <a:off x="7248085" y="3145056"/>
-              <a:ext cx="8349399" cy="5547309"/>
-            </a:xfrm>
-            <a:prstGeom prst="rect">
-              <a:avLst/>
-            </a:prstGeom>
-          </p:spPr>
-        </p:pic>
-      </p:grpSp>
-    </p:spTree>
-    <p:extLst>
-      <p:ext uri="{BB962C8B-B14F-4D97-AF65-F5344CB8AC3E}">
-        <p14:creationId xmlns:p14="http://schemas.microsoft.com/office/powerpoint/2010/main" val="1810173923"/>
-      </p:ext>
-    </p:extLst>
-  </p:cSld>
-  <p:clrMapOvr>
-    <a:masterClrMapping/>
-  </p:clrMapOvr>
-  <mc:AlternateContent xmlns:mc="http://schemas.openxmlformats.org/markup-compatibility/2006">
-    <mc:Choice xmlns:p14="http://schemas.microsoft.com/office/powerpoint/2010/main" Requires="p14">
-      <p:transition spd="med" p14:dur="700">
-        <p:fade/>
-      </p:transition>
-    </mc:Choice>
-    <mc:Fallback>
-      <p:transition spd="med">
-        <p:fade/>
-      </p:transition>
-    </mc:Fallback>
-  </mc:AlternateContent>
-</p:sld>
-</file>
-
-<file path=ppt/slides/slide3.xml><?xml version="1.0" encoding="utf-8"?>
-<p:sld xmlns:a="http://schemas.openxmlformats.org/drawingml/2006/main" xmlns:r="http://schemas.openxmlformats.org/officeDocument/2006/relationships" xmlns:p="http://schemas.openxmlformats.org/presentationml/2006/main">
-  <p:cSld>
-    <p:spTree>
-      <p:nvGrpSpPr>
-        <p:cNvPr id="1" name=""/>
-        <p:cNvGrpSpPr/>
-        <p:nvPr/>
-      </p:nvGrpSpPr>
-      <p:grpSpPr>
-        <a:xfrm>
-          <a:off x="0" y="0"/>
-          <a:ext cx="0" cy="0"/>
-          <a:chOff x="0" y="0"/>
-          <a:chExt cx="0" cy="0"/>
-        </a:xfrm>
-      </p:grpSpPr>
-      <p:sp>
-        <p:nvSpPr>
-          <p:cNvPr id="3" name="제목 2"/>
-          <p:cNvSpPr>
-            <a:spLocks noGrp="1"/>
-          </p:cNvSpPr>
-          <p:nvPr>
-            <p:ph type="title"/>
-          </p:nvPr>
         </p:nvSpPr>
         <p:spPr>
           <a:xfrm>
-            <a:off x="1404589" y="782706"/>
-            <a:ext cx="7573156" cy="584735"/>
-          </a:xfrm>
-        </p:spPr>
-        <p:txBody>
-          <a:bodyPr/>
-          <a:lstStyle/>
-          <a:p>
-            <a:r>
-              <a:rPr lang="ko-KR" altLang="en-US" dirty="0"/>
-              <a:t>특화 프로젝트 소개</a:t>
-            </a:r>
-          </a:p>
-        </p:txBody>
-      </p:sp>
-      <p:sp>
-        <p:nvSpPr>
-          <p:cNvPr id="2" name="모서리가 둥근 직사각형 1"/>
-          <p:cNvSpPr/>
-          <p:nvPr/>
-        </p:nvSpPr>
-        <p:spPr>
-          <a:xfrm>
-            <a:off x="1021358" y="1836019"/>
+            <a:off x="1052357" y="3229859"/>
             <a:ext cx="1884219" cy="429491"/>
           </a:xfrm>
           <a:prstGeom prst="roundRect">
@@ -5929,54 +5935,20 @@
             <a:pPr algn="ctr"/>
             <a:r>
               <a:rPr lang="ko-KR" altLang="en-US" sz="1600" b="1" dirty="0"/>
-              <a:t>프로젝트 주제</a:t>
-            </a:r>
-          </a:p>
-        </p:txBody>
-      </p:sp>
-      <p:sp>
-        <p:nvSpPr>
-          <p:cNvPr id="4" name="TextBox 3"/>
-          <p:cNvSpPr txBox="1"/>
+              <a:t>역할</a:t>
+            </a:r>
+          </a:p>
+        </p:txBody>
+      </p:sp>
+      <p:sp>
+        <p:nvSpPr>
+          <p:cNvPr id="12" name="모서리가 둥근 직사각형 11"/>
+          <p:cNvSpPr/>
           <p:nvPr/>
         </p:nvSpPr>
         <p:spPr>
           <a:xfrm>
-            <a:off x="3057041" y="1866098"/>
-            <a:ext cx="5997844" cy="369332"/>
-          </a:xfrm>
-          <a:prstGeom prst="rect">
-            <a:avLst/>
-          </a:prstGeom>
-          <a:noFill/>
-        </p:spPr>
-        <p:txBody>
-          <a:bodyPr wrap="square" rtlCol="0">
-            <a:spAutoFit/>
-          </a:bodyPr>
-          <a:lstStyle/>
-          <a:p>
-            <a:r>
-              <a:rPr lang="ko-KR" altLang="en-US" dirty="0"/>
-              <a:t>안전하게 만날 수 있는 약속 장소 추천 서비스</a:t>
-            </a:r>
-            <a:r>
-              <a:rPr lang="en-US" altLang="ko-KR" dirty="0"/>
-              <a:t>(CO-MEET)</a:t>
-            </a:r>
-            <a:endParaRPr lang="ko-KR" altLang="en-US" dirty="0"/>
-          </a:p>
-        </p:txBody>
-      </p:sp>
-      <p:sp>
-        <p:nvSpPr>
-          <p:cNvPr id="10" name="모서리가 둥근 직사각형 9"/>
-          <p:cNvSpPr/>
-          <p:nvPr/>
-        </p:nvSpPr>
-        <p:spPr>
-          <a:xfrm>
-            <a:off x="1021359" y="2524781"/>
+            <a:off x="1052357" y="4789592"/>
             <a:ext cx="1884219" cy="429491"/>
           </a:xfrm>
           <a:prstGeom prst="roundRect">
@@ -6012,174 +5984,11 @@
             <a:pPr algn="ctr"/>
             <a:r>
               <a:rPr lang="ko-KR" altLang="en-US" sz="1600" b="1" dirty="0"/>
-              <a:t>기술 스택</a:t>
-            </a:r>
-          </a:p>
-        </p:txBody>
-      </p:sp>
-      <p:sp>
-        <p:nvSpPr>
-          <p:cNvPr id="11" name="모서리가 둥근 직사각형 10"/>
-          <p:cNvSpPr/>
-          <p:nvPr/>
-        </p:nvSpPr>
-        <p:spPr>
-          <a:xfrm>
-            <a:off x="1052357" y="4592501"/>
-            <a:ext cx="1884219" cy="429491"/>
-          </a:xfrm>
-          <a:prstGeom prst="roundRect">
-            <a:avLst/>
-          </a:prstGeom>
-          <a:solidFill>
-            <a:srgbClr val="00B050"/>
-          </a:solidFill>
-          <a:ln>
-            <a:noFill/>
-          </a:ln>
-        </p:spPr>
-        <p:style>
-          <a:lnRef idx="2">
-            <a:schemeClr val="accent1">
-              <a:shade val="50000"/>
-            </a:schemeClr>
-          </a:lnRef>
-          <a:fillRef idx="1">
-            <a:schemeClr val="accent1"/>
-          </a:fillRef>
-          <a:effectRef idx="0">
-            <a:schemeClr val="accent1"/>
-          </a:effectRef>
-          <a:fontRef idx="minor">
-            <a:schemeClr val="lt1"/>
-          </a:fontRef>
-        </p:style>
-        <p:txBody>
-          <a:bodyPr rtlCol="0" anchor="ctr"/>
-          <a:lstStyle/>
-          <a:p>
-            <a:pPr algn="ctr"/>
-            <a:r>
-              <a:rPr lang="ko-KR" altLang="en-US" sz="1600" b="1" dirty="0"/>
-              <a:t>역할</a:t>
-            </a:r>
-          </a:p>
-        </p:txBody>
-      </p:sp>
-      <p:sp>
-        <p:nvSpPr>
-          <p:cNvPr id="12" name="모서리가 둥근 직사각형 11"/>
-          <p:cNvSpPr/>
-          <p:nvPr/>
-        </p:nvSpPr>
-        <p:spPr>
-          <a:xfrm>
-            <a:off x="1052357" y="5210933"/>
-            <a:ext cx="1884219" cy="429491"/>
-          </a:xfrm>
-          <a:prstGeom prst="roundRect">
-            <a:avLst/>
-          </a:prstGeom>
-          <a:solidFill>
-            <a:srgbClr val="00B050"/>
-          </a:solidFill>
-          <a:ln>
-            <a:noFill/>
-          </a:ln>
-        </p:spPr>
-        <p:style>
-          <a:lnRef idx="2">
-            <a:schemeClr val="accent1">
-              <a:shade val="50000"/>
-            </a:schemeClr>
-          </a:lnRef>
-          <a:fillRef idx="1">
-            <a:schemeClr val="accent1"/>
-          </a:fillRef>
-          <a:effectRef idx="0">
-            <a:schemeClr val="accent1"/>
-          </a:effectRef>
-          <a:fontRef idx="minor">
-            <a:schemeClr val="lt1"/>
-          </a:fontRef>
-        </p:style>
-        <p:txBody>
-          <a:bodyPr rtlCol="0" anchor="ctr"/>
-          <a:lstStyle/>
-          <a:p>
-            <a:pPr algn="ctr"/>
-            <a:r>
-              <a:rPr lang="ko-KR" altLang="en-US" sz="1600" b="1" dirty="0"/>
               <a:t>성과</a:t>
             </a:r>
           </a:p>
         </p:txBody>
       </p:sp>
-      <p:pic>
-        <p:nvPicPr>
-          <p:cNvPr id="1026" name="Picture 2" descr="https://cdn.discordapp.com/attachments/821553873743249428/829659864418091048/unknown.png"/>
-          <p:cNvPicPr>
-            <a:picLocks noChangeAspect="1" noChangeArrowheads="1"/>
-          </p:cNvPicPr>
-          <p:nvPr/>
-        </p:nvPicPr>
-        <p:blipFill>
-          <a:blip r:embed="rId3" cstate="print">
-            <a:extLst>
-              <a:ext uri="{28A0092B-C50C-407E-A947-70E740481C1C}">
-                <a14:useLocalDpi xmlns:a14="http://schemas.microsoft.com/office/drawing/2010/main" val="0"/>
-              </a:ext>
-            </a:extLst>
-          </a:blip>
-          <a:srcRect/>
-          <a:stretch>
-            <a:fillRect/>
-          </a:stretch>
-        </p:blipFill>
-        <p:spPr bwMode="auto">
-          <a:xfrm>
-            <a:off x="3057041" y="2431791"/>
-            <a:ext cx="4100268" cy="2067927"/>
-          </a:xfrm>
-          <a:prstGeom prst="rect">
-            <a:avLst/>
-          </a:prstGeom>
-          <a:noFill/>
-          <a:extLst>
-            <a:ext uri="{909E8E84-426E-40DD-AFC4-6F175D3DCCD1}">
-              <a14:hiddenFill xmlns:a14="http://schemas.microsoft.com/office/drawing/2010/main">
-                <a:solidFill>
-                  <a:srgbClr val="FFFFFF"/>
-                </a:solidFill>
-              </a14:hiddenFill>
-            </a:ext>
-          </a:extLst>
-        </p:spPr>
-      </p:pic>
-      <p:pic>
-        <p:nvPicPr>
-          <p:cNvPr id="5" name="그림 4"/>
-          <p:cNvPicPr>
-            <a:picLocks noChangeAspect="1"/>
-          </p:cNvPicPr>
-          <p:nvPr/>
-        </p:nvPicPr>
-        <p:blipFill>
-          <a:blip r:embed="rId4"/>
-          <a:stretch>
-            <a:fillRect/>
-          </a:stretch>
-        </p:blipFill>
-        <p:spPr>
-          <a:xfrm>
-            <a:off x="7245982" y="2381076"/>
-            <a:ext cx="4707246" cy="2211425"/>
-          </a:xfrm>
-          <a:prstGeom prst="rect">
-            <a:avLst/>
-          </a:prstGeom>
-        </p:spPr>
-      </p:pic>
       <p:sp>
         <p:nvSpPr>
           <p:cNvPr id="15" name="TextBox 14"/>
@@ -6188,8 +5997,8 @@
         </p:nvSpPr>
         <p:spPr>
           <a:xfrm>
-            <a:off x="3057041" y="4622580"/>
-            <a:ext cx="7315200" cy="369332"/>
+            <a:off x="3057041" y="3206146"/>
+            <a:ext cx="7315200" cy="1200329"/>
           </a:xfrm>
           <a:prstGeom prst="rect">
             <a:avLst/>
@@ -6212,15 +6021,22 @@
             </a:r>
             <a:r>
               <a:rPr lang="ko-KR" altLang="en-US" dirty="0"/>
-              <a:t>로그인</a:t>
+              <a:t>담당</a:t>
+            </a:r>
+            <a:endParaRPr lang="en-US" altLang="ko-KR" dirty="0"/>
+          </a:p>
+          <a:p>
+            <a:r>
+              <a:rPr lang="en-US" altLang="ko-KR" dirty="0" err="1"/>
+              <a:t>Vue.js</a:t>
             </a:r>
             <a:r>
               <a:rPr lang="en-US" altLang="ko-KR" dirty="0"/>
               <a:t>, </a:t>
             </a:r>
             <a:r>
-              <a:rPr lang="ko-KR" altLang="en-US" dirty="0"/>
-              <a:t>회원가입</a:t>
+              <a:rPr lang="en-US" altLang="ko-KR" dirty="0" err="1"/>
+              <a:t>Vuetify</a:t>
             </a:r>
             <a:r>
               <a:rPr lang="en-US" altLang="ko-KR" dirty="0"/>
@@ -6228,11 +6044,26 @@
             </a:r>
             <a:r>
               <a:rPr lang="en-US" altLang="ko-KR" dirty="0" err="1"/>
-              <a:t>LandingPage</a:t>
+              <a:t>Vuex</a:t>
             </a:r>
             <a:r>
               <a:rPr lang="en-US" altLang="ko-KR" dirty="0"/>
-              <a:t>, FAQ</a:t>
+              <a:t>, </a:t>
+            </a:r>
+            <a:r>
+              <a:rPr lang="en-US" altLang="ko-KR" dirty="0" err="1"/>
+              <a:t>Axios</a:t>
+            </a:r>
+            <a:r>
+              <a:rPr lang="ko-KR" altLang="en-US" dirty="0"/>
+              <a:t>를 사용</a:t>
+            </a:r>
+            <a:endParaRPr lang="en-US" altLang="ko-KR" dirty="0"/>
+          </a:p>
+          <a:p>
+            <a:r>
+              <a:rPr lang="en-US" altLang="ko-KR" dirty="0"/>
+              <a:t>FAQ </a:t>
             </a:r>
             <a:r>
               <a:rPr lang="ko-KR" altLang="en-US" dirty="0"/>
@@ -6240,11 +6071,26 @@
             </a:r>
             <a:r>
               <a:rPr lang="en-US" altLang="ko-KR" dirty="0"/>
+              <a:t>, Landing </a:t>
+            </a:r>
+            <a:r>
+              <a:rPr lang="ko-KR" altLang="en-US" dirty="0"/>
+              <a:t>페이지</a:t>
+            </a:r>
+            <a:r>
+              <a:rPr lang="en-US" altLang="ko-KR" dirty="0"/>
               <a:t>, </a:t>
             </a:r>
             <a:r>
               <a:rPr lang="ko-KR" altLang="en-US" dirty="0"/>
-              <a:t>검색 로그</a:t>
+              <a:t>회원가입 및 로그인</a:t>
+            </a:r>
+            <a:endParaRPr lang="en-US" altLang="ko-KR" dirty="0"/>
+          </a:p>
+          <a:p>
+            <a:r>
+              <a:rPr lang="ko-KR" altLang="en-US" dirty="0"/>
+              <a:t>최근 검색 로그 기능</a:t>
             </a:r>
           </a:p>
         </p:txBody>
@@ -6257,7 +6103,7 @@
         </p:nvSpPr>
         <p:spPr>
           <a:xfrm>
-            <a:off x="3057040" y="5210933"/>
+            <a:off x="3057040" y="4771662"/>
             <a:ext cx="6865749" cy="923330"/>
           </a:xfrm>
           <a:prstGeom prst="rect">

</xml_diff>